<commit_message>
couple of changes : VP
</commit_message>
<xml_diff>
--- a/C#.net interview Questions/Interview Questions.pptx
+++ b/C#.net interview Questions/Interview Questions.pptx
@@ -197,7 +197,7 @@
           <a:p>
             <a:fld id="{2FB6FFA2-5596-DA47-A26B-229D3D705C9C}" type="datetimeFigureOut">
               <a:rPr lang="en-US" smtClean="0"/>
-              <a:t>5/17/22</a:t>
+              <a:t>5/23/22</a:t>
             </a:fld>
             <a:endParaRPr lang="en-US"/>
           </a:p>
@@ -695,7 +695,7 @@
           <a:p>
             <a:fld id="{D7AFABE5-C7E3-F145-818B-F1C9F2CF8384}" type="datetimeFigureOut">
               <a:rPr lang="en-US" smtClean="0"/>
-              <a:t>5/17/22</a:t>
+              <a:t>5/23/22</a:t>
             </a:fld>
             <a:endParaRPr lang="en-US"/>
           </a:p>
@@ -893,7 +893,7 @@
           <a:p>
             <a:fld id="{D7AFABE5-C7E3-F145-818B-F1C9F2CF8384}" type="datetimeFigureOut">
               <a:rPr lang="en-US" smtClean="0"/>
-              <a:t>5/17/22</a:t>
+              <a:t>5/23/22</a:t>
             </a:fld>
             <a:endParaRPr lang="en-US"/>
           </a:p>
@@ -1101,7 +1101,7 @@
           <a:p>
             <a:fld id="{D7AFABE5-C7E3-F145-818B-F1C9F2CF8384}" type="datetimeFigureOut">
               <a:rPr lang="en-US" smtClean="0"/>
-              <a:t>5/17/22</a:t>
+              <a:t>5/23/22</a:t>
             </a:fld>
             <a:endParaRPr lang="en-US"/>
           </a:p>
@@ -1299,7 +1299,7 @@
           <a:p>
             <a:fld id="{D7AFABE5-C7E3-F145-818B-F1C9F2CF8384}" type="datetimeFigureOut">
               <a:rPr lang="en-US" smtClean="0"/>
-              <a:t>5/17/22</a:t>
+              <a:t>5/23/22</a:t>
             </a:fld>
             <a:endParaRPr lang="en-US"/>
           </a:p>
@@ -1574,7 +1574,7 @@
           <a:p>
             <a:fld id="{D7AFABE5-C7E3-F145-818B-F1C9F2CF8384}" type="datetimeFigureOut">
               <a:rPr lang="en-US" smtClean="0"/>
-              <a:t>5/17/22</a:t>
+              <a:t>5/23/22</a:t>
             </a:fld>
             <a:endParaRPr lang="en-US"/>
           </a:p>
@@ -1839,7 +1839,7 @@
           <a:p>
             <a:fld id="{D7AFABE5-C7E3-F145-818B-F1C9F2CF8384}" type="datetimeFigureOut">
               <a:rPr lang="en-US" smtClean="0"/>
-              <a:t>5/17/22</a:t>
+              <a:t>5/23/22</a:t>
             </a:fld>
             <a:endParaRPr lang="en-US"/>
           </a:p>
@@ -2251,7 +2251,7 @@
           <a:p>
             <a:fld id="{D7AFABE5-C7E3-F145-818B-F1C9F2CF8384}" type="datetimeFigureOut">
               <a:rPr lang="en-US" smtClean="0"/>
-              <a:t>5/17/22</a:t>
+              <a:t>5/23/22</a:t>
             </a:fld>
             <a:endParaRPr lang="en-US"/>
           </a:p>
@@ -2392,7 +2392,7 @@
           <a:p>
             <a:fld id="{D7AFABE5-C7E3-F145-818B-F1C9F2CF8384}" type="datetimeFigureOut">
               <a:rPr lang="en-US" smtClean="0"/>
-              <a:t>5/17/22</a:t>
+              <a:t>5/23/22</a:t>
             </a:fld>
             <a:endParaRPr lang="en-US"/>
           </a:p>
@@ -2505,7 +2505,7 @@
           <a:p>
             <a:fld id="{D7AFABE5-C7E3-F145-818B-F1C9F2CF8384}" type="datetimeFigureOut">
               <a:rPr lang="en-US" smtClean="0"/>
-              <a:t>5/17/22</a:t>
+              <a:t>5/23/22</a:t>
             </a:fld>
             <a:endParaRPr lang="en-US"/>
           </a:p>
@@ -2816,7 +2816,7 @@
           <a:p>
             <a:fld id="{D7AFABE5-C7E3-F145-818B-F1C9F2CF8384}" type="datetimeFigureOut">
               <a:rPr lang="en-US" smtClean="0"/>
-              <a:t>5/17/22</a:t>
+              <a:t>5/23/22</a:t>
             </a:fld>
             <a:endParaRPr lang="en-US"/>
           </a:p>
@@ -3104,7 +3104,7 @@
           <a:p>
             <a:fld id="{D7AFABE5-C7E3-F145-818B-F1C9F2CF8384}" type="datetimeFigureOut">
               <a:rPr lang="en-US" smtClean="0"/>
-              <a:t>5/17/22</a:t>
+              <a:t>5/23/22</a:t>
             </a:fld>
             <a:endParaRPr lang="en-US"/>
           </a:p>
@@ -3345,7 +3345,7 @@
           <a:p>
             <a:fld id="{D7AFABE5-C7E3-F145-818B-F1C9F2CF8384}" type="datetimeFigureOut">
               <a:rPr lang="en-US" smtClean="0"/>
-              <a:t>5/17/22</a:t>
+              <a:t>5/23/22</a:t>
             </a:fld>
             <a:endParaRPr lang="en-US"/>
           </a:p>
@@ -4058,7 +4058,7 @@
           <a:p>
             <a:r>
               <a:rPr lang="en-US" sz="1600" dirty="0"/>
-              <a:t>Difference between Action and Fun</a:t>
+              <a:t>Difference between Action, Fun and predicate</a:t>
             </a:r>
           </a:p>
           <a:p>

</xml_diff>